<commit_message>
Design step is being written for paper. FEA results are going to be obtained.
</commit_message>
<xml_diff>
--- a/Weekly Reports/2020.03.16 - 2020.03.23.pptx
+++ b/Weekly Reports/2020.03.16 - 2020.03.23.pptx
@@ -5,13 +5,14 @@
     <p:sldMasterId id="2147483648" r:id="rId1"/>
   </p:sldMasterIdLst>
   <p:notesMasterIdLst>
-    <p:notesMasterId r:id="rId6"/>
+    <p:notesMasterId r:id="rId7"/>
   </p:notesMasterIdLst>
   <p:sldIdLst>
     <p:sldId id="287" r:id="rId2"/>
     <p:sldId id="288" r:id="rId3"/>
     <p:sldId id="289" r:id="rId4"/>
     <p:sldId id="290" r:id="rId5"/>
+    <p:sldId id="291" r:id="rId6"/>
   </p:sldIdLst>
   <p:sldSz cx="12192000" cy="6858000"/>
   <p:notesSz cx="6858000" cy="9144000"/>
@@ -200,7 +201,7 @@
           <a:p>
             <a:fld id="{6967AB47-6931-48C6-B7ED-326D1228AFBA}" type="datetimeFigureOut">
               <a:rPr lang="tr-TR" smtClean="0"/>
-              <a:t>18.03.2020</a:t>
+              <a:t>23.03.2020</a:t>
             </a:fld>
             <a:endParaRPr lang="tr-TR"/>
           </a:p>
@@ -599,7 +600,7 @@
           <a:p>
             <a:fld id="{BD3B3769-65FE-41EA-85B6-D9F2AF76CBA9}" type="datetime1">
               <a:rPr lang="tr-TR" smtClean="0"/>
-              <a:t>18.03.2020</a:t>
+              <a:t>23.03.2020</a:t>
             </a:fld>
             <a:endParaRPr lang="tr-TR"/>
           </a:p>
@@ -769,7 +770,7 @@
           <a:p>
             <a:fld id="{2962A6A9-D976-4BDA-B10C-66B2B9DE9B4C}" type="datetime1">
               <a:rPr lang="tr-TR" smtClean="0"/>
-              <a:t>18.03.2020</a:t>
+              <a:t>23.03.2020</a:t>
             </a:fld>
             <a:endParaRPr lang="tr-TR"/>
           </a:p>
@@ -949,7 +950,7 @@
           <a:p>
             <a:fld id="{5600552A-E4D4-4B40-9929-1D3FB71F71FF}" type="datetime1">
               <a:rPr lang="tr-TR" smtClean="0"/>
-              <a:t>18.03.2020</a:t>
+              <a:t>23.03.2020</a:t>
             </a:fld>
             <a:endParaRPr lang="tr-TR"/>
           </a:p>
@@ -1119,7 +1120,7 @@
           <a:p>
             <a:fld id="{F9A85ECC-3CE4-4AD0-8EC5-3A36763AA76F}" type="datetime1">
               <a:rPr lang="tr-TR" smtClean="0"/>
-              <a:t>18.03.2020</a:t>
+              <a:t>23.03.2020</a:t>
             </a:fld>
             <a:endParaRPr lang="tr-TR"/>
           </a:p>
@@ -1365,7 +1366,7 @@
           <a:p>
             <a:fld id="{39F6AA4B-9646-44CC-B325-B50A183D6636}" type="datetime1">
               <a:rPr lang="tr-TR" smtClean="0"/>
-              <a:t>18.03.2020</a:t>
+              <a:t>23.03.2020</a:t>
             </a:fld>
             <a:endParaRPr lang="tr-TR"/>
           </a:p>
@@ -1597,7 +1598,7 @@
           <a:p>
             <a:fld id="{FD69D89B-A78C-481C-B4BE-82E51E30BA9C}" type="datetime1">
               <a:rPr lang="tr-TR" smtClean="0"/>
-              <a:t>18.03.2020</a:t>
+              <a:t>23.03.2020</a:t>
             </a:fld>
             <a:endParaRPr lang="tr-TR"/>
           </a:p>
@@ -1964,7 +1965,7 @@
           <a:p>
             <a:fld id="{473BE270-57FE-4717-982D-F02DFB5BECD5}" type="datetime1">
               <a:rPr lang="tr-TR" smtClean="0"/>
-              <a:t>18.03.2020</a:t>
+              <a:t>23.03.2020</a:t>
             </a:fld>
             <a:endParaRPr lang="tr-TR"/>
           </a:p>
@@ -2082,7 +2083,7 @@
           <a:p>
             <a:fld id="{BFAEDD45-6991-4862-9E84-DDF92EF341CB}" type="datetime1">
               <a:rPr lang="tr-TR" smtClean="0"/>
-              <a:t>18.03.2020</a:t>
+              <a:t>23.03.2020</a:t>
             </a:fld>
             <a:endParaRPr lang="tr-TR"/>
           </a:p>
@@ -2177,7 +2178,7 @@
           <a:p>
             <a:fld id="{23EE56C6-14E9-4870-96BE-3550760A1300}" type="datetime1">
               <a:rPr lang="tr-TR" smtClean="0"/>
-              <a:t>18.03.2020</a:t>
+              <a:t>23.03.2020</a:t>
             </a:fld>
             <a:endParaRPr lang="tr-TR"/>
           </a:p>
@@ -2454,7 +2455,7 @@
           <a:p>
             <a:fld id="{5EB3015D-7E17-406D-9A1A-3B2ADCD0CF79}" type="datetime1">
               <a:rPr lang="tr-TR" smtClean="0"/>
-              <a:t>18.03.2020</a:t>
+              <a:t>23.03.2020</a:t>
             </a:fld>
             <a:endParaRPr lang="tr-TR"/>
           </a:p>
@@ -2707,7 +2708,7 @@
           <a:p>
             <a:fld id="{8E1B6673-63A0-461F-BFBD-58F4D74CC1A0}" type="datetime1">
               <a:rPr lang="tr-TR" smtClean="0"/>
-              <a:t>18.03.2020</a:t>
+              <a:t>23.03.2020</a:t>
             </a:fld>
             <a:endParaRPr lang="tr-TR"/>
           </a:p>
@@ -2920,7 +2921,7 @@
           <a:p>
             <a:fld id="{9E8EF2ED-7087-4201-9521-97BB02159B09}" type="datetime1">
               <a:rPr lang="tr-TR" smtClean="0"/>
-              <a:t>18.03.2020</a:t>
+              <a:t>23.03.2020</a:t>
             </a:fld>
             <a:endParaRPr lang="tr-TR"/>
           </a:p>
@@ -4281,31 +4282,7 @@
                   <a:srgbClr val="FF0000"/>
                 </a:solidFill>
               </a:rPr>
-              <a:t>Is mutual </a:t>
-            </a:r>
-            <a:r>
-              <a:rPr lang="tr-TR" dirty="0" smtClean="0">
-                <a:solidFill>
-                  <a:srgbClr val="FF0000"/>
-                </a:solidFill>
-              </a:rPr>
-              <a:t>coupling </a:t>
-            </a:r>
-            <a:r>
-              <a:rPr lang="tr-TR" dirty="0" smtClean="0">
-                <a:solidFill>
-                  <a:srgbClr val="FF0000"/>
-                </a:solidFill>
-              </a:rPr>
-              <a:t>ineffective</a:t>
-            </a:r>
-            <a:r>
-              <a:rPr lang="tr-TR" dirty="0" smtClean="0">
-                <a:solidFill>
-                  <a:srgbClr val="FF0000"/>
-                </a:solidFill>
-              </a:rPr>
-              <a:t>?</a:t>
+              <a:t>Is mutual coupling ineffective?</a:t>
             </a:r>
             <a:endParaRPr lang="tr-TR" dirty="0">
               <a:solidFill>
@@ -4868,10 +4845,544 @@
           </a:prstGeom>
         </p:spPr>
       </p:pic>
+      <p:pic>
+        <p:nvPicPr>
+          <p:cNvPr id="3" name="Picture 2"/>
+          <p:cNvPicPr>
+            <a:picLocks noChangeAspect="1"/>
+          </p:cNvPicPr>
+          <p:nvPr/>
+        </p:nvPicPr>
+        <p:blipFill>
+          <a:blip r:embed="rId3"/>
+          <a:stretch>
+            <a:fillRect/>
+          </a:stretch>
+        </p:blipFill>
+        <p:spPr>
+          <a:xfrm>
+            <a:off x="5848336" y="1370975"/>
+            <a:ext cx="5737501" cy="3866667"/>
+          </a:xfrm>
+          <a:prstGeom prst="rect">
+            <a:avLst/>
+          </a:prstGeom>
+        </p:spPr>
+      </p:pic>
+      <p:pic>
+        <p:nvPicPr>
+          <p:cNvPr id="5" name="Picture 4"/>
+          <p:cNvPicPr>
+            <a:picLocks noChangeAspect="1"/>
+          </p:cNvPicPr>
+          <p:nvPr/>
+        </p:nvPicPr>
+        <p:blipFill>
+          <a:blip r:embed="rId4"/>
+          <a:stretch>
+            <a:fillRect/>
+          </a:stretch>
+        </p:blipFill>
+        <p:spPr>
+          <a:xfrm>
+            <a:off x="6587296" y="2552009"/>
+            <a:ext cx="3223388" cy="2172334"/>
+          </a:xfrm>
+          <a:prstGeom prst="rect">
+            <a:avLst/>
+          </a:prstGeom>
+        </p:spPr>
+      </p:pic>
+      <p:cxnSp>
+        <p:nvCxnSpPr>
+          <p:cNvPr id="7" name="Straight Arrow Connector 6"/>
+          <p:cNvCxnSpPr/>
+          <p:nvPr/>
+        </p:nvCxnSpPr>
+        <p:spPr>
+          <a:xfrm flipH="1">
+            <a:off x="8552411" y="2435631"/>
+            <a:ext cx="732905" cy="498763"/>
+          </a:xfrm>
+          <a:prstGeom prst="straightConnector1">
+            <a:avLst/>
+          </a:prstGeom>
+          <a:ln w="38100">
+            <a:solidFill>
+              <a:srgbClr val="FF0000"/>
+            </a:solidFill>
+            <a:tailEnd type="triangle"/>
+          </a:ln>
+        </p:spPr>
+        <p:style>
+          <a:lnRef idx="1">
+            <a:schemeClr val="accent1"/>
+          </a:lnRef>
+          <a:fillRef idx="0">
+            <a:schemeClr val="accent1"/>
+          </a:fillRef>
+          <a:effectRef idx="0">
+            <a:schemeClr val="accent1"/>
+          </a:effectRef>
+          <a:fontRef idx="minor">
+            <a:schemeClr val="tx1"/>
+          </a:fontRef>
+        </p:style>
+      </p:cxnSp>
     </p:spTree>
     <p:extLst>
       <p:ext uri="{BB962C8B-B14F-4D97-AF65-F5344CB8AC3E}">
         <p14:creationId xmlns:p14="http://schemas.microsoft.com/office/powerpoint/2010/main" val="848452112"/>
+      </p:ext>
+    </p:extLst>
+  </p:cSld>
+  <p:clrMapOvr>
+    <a:masterClrMapping/>
+  </p:clrMapOvr>
+  <p:timing>
+    <p:tnLst>
+      <p:par>
+        <p:cTn id="1" dur="indefinite" restart="never" nodeType="tmRoot"/>
+      </p:par>
+    </p:tnLst>
+  </p:timing>
+</p:sld>
+</file>
+
+<file path=ppt/slides/slide5.xml><?xml version="1.0" encoding="utf-8"?>
+<p:sld xmlns:a="http://schemas.openxmlformats.org/drawingml/2006/main" xmlns:r="http://schemas.openxmlformats.org/officeDocument/2006/relationships" xmlns:p="http://schemas.openxmlformats.org/presentationml/2006/main">
+  <p:cSld>
+    <p:spTree>
+      <p:nvGrpSpPr>
+        <p:cNvPr id="1" name=""/>
+        <p:cNvGrpSpPr/>
+        <p:nvPr/>
+      </p:nvGrpSpPr>
+      <p:grpSpPr>
+        <a:xfrm>
+          <a:off x="0" y="0"/>
+          <a:ext cx="0" cy="0"/>
+          <a:chOff x="0" y="0"/>
+          <a:chExt cx="0" cy="0"/>
+        </a:xfrm>
+      </p:grpSpPr>
+      <p:sp>
+        <p:nvSpPr>
+          <p:cNvPr id="4" name="Slide Number Placeholder 3"/>
+          <p:cNvSpPr>
+            <a:spLocks noGrp="1"/>
+          </p:cNvSpPr>
+          <p:nvPr>
+            <p:ph type="sldNum" sz="quarter" idx="12"/>
+          </p:nvPr>
+        </p:nvSpPr>
+        <p:spPr/>
+        <p:txBody>
+          <a:bodyPr/>
+          <a:lstStyle/>
+          <a:p>
+            <a:fld id="{178508F5-8E49-4F57-B165-331DE2AB85B8}" type="slidenum">
+              <a:rPr lang="tr-TR" sz="1800" smtClean="0"/>
+              <a:t>5</a:t>
+            </a:fld>
+            <a:endParaRPr lang="tr-TR" sz="1800" dirty="0"/>
+          </a:p>
+        </p:txBody>
+      </p:sp>
+      <p:sp>
+        <p:nvSpPr>
+          <p:cNvPr id="19" name="TextBox 18"/>
+          <p:cNvSpPr txBox="1"/>
+          <p:nvPr/>
+        </p:nvSpPr>
+        <p:spPr>
+          <a:xfrm>
+            <a:off x="110835" y="46086"/>
+            <a:ext cx="3829397" cy="369332"/>
+          </a:xfrm>
+          <a:prstGeom prst="rect">
+            <a:avLst/>
+          </a:prstGeom>
+          <a:noFill/>
+        </p:spPr>
+        <p:txBody>
+          <a:bodyPr wrap="square" rtlCol="0">
+            <a:spAutoFit/>
+          </a:bodyPr>
+          <a:lstStyle/>
+          <a:p>
+            <a:pPr algn="ctr"/>
+            <a:r>
+              <a:rPr lang="tr-TR" b="1" dirty="0" smtClean="0"/>
+              <a:t>Layout Modeling</a:t>
+            </a:r>
+            <a:endParaRPr lang="tr-TR" b="1" dirty="0"/>
+          </a:p>
+        </p:txBody>
+      </p:sp>
+      <p:pic>
+        <p:nvPicPr>
+          <p:cNvPr id="6" name="Picture 5"/>
+          <p:cNvPicPr>
+            <a:picLocks noChangeAspect="1"/>
+          </p:cNvPicPr>
+          <p:nvPr/>
+        </p:nvPicPr>
+        <p:blipFill>
+          <a:blip r:embed="rId2"/>
+          <a:stretch>
+            <a:fillRect/>
+          </a:stretch>
+        </p:blipFill>
+        <p:spPr>
+          <a:xfrm>
+            <a:off x="5257280" y="561552"/>
+            <a:ext cx="6322349" cy="5661129"/>
+          </a:xfrm>
+          <a:prstGeom prst="rect">
+            <a:avLst/>
+          </a:prstGeom>
+        </p:spPr>
+      </p:pic>
+      <p:cxnSp>
+        <p:nvCxnSpPr>
+          <p:cNvPr id="9" name="Straight Arrow Connector 8"/>
+          <p:cNvCxnSpPr/>
+          <p:nvPr/>
+        </p:nvCxnSpPr>
+        <p:spPr>
+          <a:xfrm flipH="1" flipV="1">
+            <a:off x="5677593" y="2410691"/>
+            <a:ext cx="2115892" cy="114697"/>
+          </a:xfrm>
+          <a:prstGeom prst="straightConnector1">
+            <a:avLst/>
+          </a:prstGeom>
+          <a:ln w="38100">
+            <a:solidFill>
+              <a:srgbClr val="FF0000"/>
+            </a:solidFill>
+            <a:tailEnd type="triangle"/>
+          </a:ln>
+        </p:spPr>
+        <p:style>
+          <a:lnRef idx="1">
+            <a:schemeClr val="accent1"/>
+          </a:lnRef>
+          <a:fillRef idx="0">
+            <a:schemeClr val="accent1"/>
+          </a:fillRef>
+          <a:effectRef idx="0">
+            <a:schemeClr val="accent1"/>
+          </a:effectRef>
+          <a:fontRef idx="minor">
+            <a:schemeClr val="tx1"/>
+          </a:fontRef>
+        </p:style>
+      </p:cxnSp>
+      <p:sp>
+        <p:nvSpPr>
+          <p:cNvPr id="10" name="TextBox 9"/>
+          <p:cNvSpPr txBox="1"/>
+          <p:nvPr/>
+        </p:nvSpPr>
+        <p:spPr>
+          <a:xfrm>
+            <a:off x="4305101" y="2156056"/>
+            <a:ext cx="1314303" cy="646331"/>
+          </a:xfrm>
+          <a:prstGeom prst="rect">
+            <a:avLst/>
+          </a:prstGeom>
+          <a:noFill/>
+        </p:spPr>
+        <p:txBody>
+          <a:bodyPr wrap="square" rtlCol="0">
+            <a:spAutoFit/>
+          </a:bodyPr>
+          <a:lstStyle/>
+          <a:p>
+            <a:pPr algn="ctr"/>
+            <a:r>
+              <a:rPr lang="tr-TR" dirty="0" smtClean="0">
+                <a:solidFill>
+                  <a:srgbClr val="FF0000"/>
+                </a:solidFill>
+              </a:rPr>
+              <a:t>Power Loop Model</a:t>
+            </a:r>
+            <a:endParaRPr lang="tr-TR" dirty="0">
+              <a:solidFill>
+                <a:srgbClr val="FF0000"/>
+              </a:solidFill>
+            </a:endParaRPr>
+          </a:p>
+        </p:txBody>
+      </p:sp>
+      <p:cxnSp>
+        <p:nvCxnSpPr>
+          <p:cNvPr id="13" name="Straight Arrow Connector 12"/>
+          <p:cNvCxnSpPr/>
+          <p:nvPr/>
+        </p:nvCxnSpPr>
+        <p:spPr>
+          <a:xfrm flipH="1" flipV="1">
+            <a:off x="5805055" y="5647112"/>
+            <a:ext cx="2115892" cy="114697"/>
+          </a:xfrm>
+          <a:prstGeom prst="straightConnector1">
+            <a:avLst/>
+          </a:prstGeom>
+          <a:ln w="38100">
+            <a:solidFill>
+              <a:srgbClr val="FF0000"/>
+            </a:solidFill>
+            <a:tailEnd type="triangle"/>
+          </a:ln>
+        </p:spPr>
+        <p:style>
+          <a:lnRef idx="1">
+            <a:schemeClr val="accent1"/>
+          </a:lnRef>
+          <a:fillRef idx="0">
+            <a:schemeClr val="accent1"/>
+          </a:fillRef>
+          <a:effectRef idx="0">
+            <a:schemeClr val="accent1"/>
+          </a:effectRef>
+          <a:fontRef idx="minor">
+            <a:schemeClr val="tx1"/>
+          </a:fontRef>
+        </p:style>
+      </p:cxnSp>
+      <p:sp>
+        <p:nvSpPr>
+          <p:cNvPr id="14" name="TextBox 13"/>
+          <p:cNvSpPr txBox="1"/>
+          <p:nvPr/>
+        </p:nvSpPr>
+        <p:spPr>
+          <a:xfrm>
+            <a:off x="4432563" y="5392477"/>
+            <a:ext cx="1314303" cy="646331"/>
+          </a:xfrm>
+          <a:prstGeom prst="rect">
+            <a:avLst/>
+          </a:prstGeom>
+          <a:noFill/>
+        </p:spPr>
+        <p:txBody>
+          <a:bodyPr wrap="square" rtlCol="0">
+            <a:spAutoFit/>
+          </a:bodyPr>
+          <a:lstStyle/>
+          <a:p>
+            <a:pPr algn="ctr"/>
+            <a:r>
+              <a:rPr lang="tr-TR" dirty="0" smtClean="0">
+                <a:solidFill>
+                  <a:srgbClr val="FF0000"/>
+                </a:solidFill>
+              </a:rPr>
+              <a:t>Sense Loop Model</a:t>
+            </a:r>
+            <a:endParaRPr lang="tr-TR" dirty="0">
+              <a:solidFill>
+                <a:srgbClr val="FF0000"/>
+              </a:solidFill>
+            </a:endParaRPr>
+          </a:p>
+        </p:txBody>
+      </p:sp>
+      <p:graphicFrame>
+        <p:nvGraphicFramePr>
+          <p:cNvPr id="12" name="Table 11"/>
+          <p:cNvGraphicFramePr>
+            <a:graphicFrameLocks noGrp="1"/>
+          </p:cNvGraphicFramePr>
+          <p:nvPr>
+            <p:extLst>
+              <p:ext uri="{D42A27DB-BD31-4B8C-83A1-F6EECF244321}">
+                <p14:modId xmlns:p14="http://schemas.microsoft.com/office/powerpoint/2010/main" val="3340498243"/>
+              </p:ext>
+            </p:extLst>
+          </p:nvPr>
+        </p:nvGraphicFramePr>
+        <p:xfrm>
+          <a:off x="319577" y="1737177"/>
+          <a:ext cx="3067113" cy="1381760"/>
+        </p:xfrm>
+        <a:graphic>
+          <a:graphicData uri="http://schemas.openxmlformats.org/drawingml/2006/table">
+            <a:tbl>
+              <a:tblPr firstRow="1" bandRow="1">
+                <a:tableStyleId>{5C22544A-7EE6-4342-B048-85BDC9FD1C3A}</a:tableStyleId>
+              </a:tblPr>
+              <a:tblGrid>
+                <a:gridCol w="1984248">
+                  <a:extLst>
+                    <a:ext uri="{9D8B030D-6E8A-4147-A177-3AD203B41FA5}">
+                      <a16:colId xmlns:a16="http://schemas.microsoft.com/office/drawing/2014/main" val="1866115373"/>
+                    </a:ext>
+                  </a:extLst>
+                </a:gridCol>
+                <a:gridCol w="1082865">
+                  <a:extLst>
+                    <a:ext uri="{9D8B030D-6E8A-4147-A177-3AD203B41FA5}">
+                      <a16:colId xmlns:a16="http://schemas.microsoft.com/office/drawing/2014/main" val="2466772991"/>
+                    </a:ext>
+                  </a:extLst>
+                </a:gridCol>
+              </a:tblGrid>
+              <a:tr h="370840">
+                <a:tc>
+                  <a:txBody>
+                    <a:bodyPr/>
+                    <a:lstStyle/>
+                    <a:p>
+                      <a:r>
+                        <a:rPr lang="tr-TR" dirty="0" smtClean="0"/>
+                        <a:t>Sense Loop</a:t>
+                      </a:r>
+                      <a:endParaRPr lang="tr-TR" dirty="0"/>
+                    </a:p>
+                  </a:txBody>
+                  <a:tcPr/>
+                </a:tc>
+                <a:tc>
+                  <a:txBody>
+                    <a:bodyPr/>
+                    <a:lstStyle/>
+                    <a:p>
+                      <a:r>
+                        <a:rPr lang="tr-TR" dirty="0" smtClean="0"/>
+                        <a:t>Induced Voltage*</a:t>
+                      </a:r>
+                      <a:endParaRPr lang="tr-TR" dirty="0"/>
+                    </a:p>
+                  </a:txBody>
+                  <a:tcPr/>
+                </a:tc>
+                <a:extLst>
+                  <a:ext uri="{0D108BD9-81ED-4DB2-BD59-A6C34878D82A}">
+                    <a16:rowId xmlns:a16="http://schemas.microsoft.com/office/drawing/2014/main" val="60537967"/>
+                  </a:ext>
+                </a:extLst>
+              </a:tr>
+              <a:tr h="370840">
+                <a:tc>
+                  <a:txBody>
+                    <a:bodyPr/>
+                    <a:lstStyle/>
+                    <a:p>
+                      <a:r>
+                        <a:rPr lang="tr-TR" dirty="0" smtClean="0"/>
+                        <a:t>Winding</a:t>
+                      </a:r>
+                      <a:r>
+                        <a:rPr lang="tr-TR" baseline="0" dirty="0" smtClean="0"/>
+                        <a:t> Definition</a:t>
+                      </a:r>
+                    </a:p>
+                  </a:txBody>
+                  <a:tcPr/>
+                </a:tc>
+                <a:tc>
+                  <a:txBody>
+                    <a:bodyPr/>
+                    <a:lstStyle/>
+                    <a:p>
+                      <a:r>
+                        <a:rPr lang="tr-TR" dirty="0" smtClean="0"/>
+                        <a:t>0.2 V</a:t>
+                      </a:r>
+                    </a:p>
+                  </a:txBody>
+                  <a:tcPr/>
+                </a:tc>
+                <a:extLst>
+                  <a:ext uri="{0D108BD9-81ED-4DB2-BD59-A6C34878D82A}">
+                    <a16:rowId xmlns:a16="http://schemas.microsoft.com/office/drawing/2014/main" val="629310275"/>
+                  </a:ext>
+                </a:extLst>
+              </a:tr>
+              <a:tr h="370840">
+                <a:tc>
+                  <a:txBody>
+                    <a:bodyPr/>
+                    <a:lstStyle/>
+                    <a:p>
+                      <a:r>
+                        <a:rPr lang="tr-TR" dirty="0" smtClean="0"/>
+                        <a:t>Insulating</a:t>
+                      </a:r>
+                      <a:endParaRPr lang="tr-TR" dirty="0"/>
+                    </a:p>
+                  </a:txBody>
+                  <a:tcPr/>
+                </a:tc>
+                <a:tc>
+                  <a:txBody>
+                    <a:bodyPr/>
+                    <a:lstStyle/>
+                    <a:p>
+                      <a:r>
+                        <a:rPr lang="tr-TR" dirty="0" smtClean="0"/>
+                        <a:t>0.55</a:t>
+                      </a:r>
+                      <a:r>
+                        <a:rPr lang="tr-TR" baseline="0" dirty="0" smtClean="0"/>
+                        <a:t> V</a:t>
+                      </a:r>
+                      <a:endParaRPr lang="tr-TR" dirty="0"/>
+                    </a:p>
+                  </a:txBody>
+                  <a:tcPr/>
+                </a:tc>
+                <a:extLst>
+                  <a:ext uri="{0D108BD9-81ED-4DB2-BD59-A6C34878D82A}">
+                    <a16:rowId xmlns:a16="http://schemas.microsoft.com/office/drawing/2014/main" val="839046187"/>
+                  </a:ext>
+                </a:extLst>
+              </a:tr>
+            </a:tbl>
+          </a:graphicData>
+        </a:graphic>
+      </p:graphicFrame>
+      <p:sp>
+        <p:nvSpPr>
+          <p:cNvPr id="15" name="TextBox 14"/>
+          <p:cNvSpPr txBox="1"/>
+          <p:nvPr/>
+        </p:nvSpPr>
+        <p:spPr>
+          <a:xfrm>
+            <a:off x="1115279" y="3118937"/>
+            <a:ext cx="2443941" cy="369332"/>
+          </a:xfrm>
+          <a:prstGeom prst="rect">
+            <a:avLst/>
+          </a:prstGeom>
+          <a:noFill/>
+        </p:spPr>
+        <p:txBody>
+          <a:bodyPr wrap="square" rtlCol="0">
+            <a:spAutoFit/>
+          </a:bodyPr>
+          <a:lstStyle/>
+          <a:p>
+            <a:r>
+              <a:rPr lang="tr-TR" dirty="0" smtClean="0"/>
+              <a:t>*For 3.7 A/ns slew rate</a:t>
+            </a:r>
+            <a:endParaRPr lang="tr-TR" dirty="0"/>
+          </a:p>
+        </p:txBody>
+      </p:sp>
+    </p:spTree>
+    <p:extLst>
+      <p:ext uri="{BB962C8B-B14F-4D97-AF65-F5344CB8AC3E}">
+        <p14:creationId xmlns:p14="http://schemas.microsoft.com/office/powerpoint/2010/main" val="3671310766"/>
       </p:ext>
     </p:extLst>
   </p:cSld>

</xml_diff>